<commit_message>
update CI slide, doc_link.txt for docker, docker.docx
</commit_message>
<xml_diff>
--- a/CI/CI.pptx
+++ b/CI/CI.pptx
@@ -26,6 +26,7 @@
     <p:sldId id="272" r:id="rId20"/>
     <p:sldId id="273" r:id="rId21"/>
     <p:sldId id="269" r:id="rId22"/>
+    <p:sldId id="278" r:id="rId23"/>
   </p:sldIdLst>
   <p:sldSz cx="12192000" cy="6858000"/>
   <p:notesSz cx="6858000" cy="9144000"/>
@@ -257,7 +258,7 @@
             <a:fld id="{D314177D-4D24-4D5B-9883-5FDB7C835FD3}" type="datetimeFigureOut">
               <a:rPr lang="zh-CN" altLang="en-US" smtClean="0"/>
               <a:pPr/>
-              <a:t>2016/9/26</a:t>
+              <a:t>2016/9/27</a:t>
             </a:fld>
             <a:endParaRPr lang="zh-CN" altLang="en-US"/>
           </a:p>
@@ -309,7 +310,7 @@
     </p:spTree>
     <p:extLst>
       <p:ext uri="{BB962C8B-B14F-4D97-AF65-F5344CB8AC3E}">
-        <p14:creationId xmlns="" xmlns:p14="http://schemas.microsoft.com/office/powerpoint/2010/main" val="179433876"/>
+        <p14:creationId xmlns:p14="http://schemas.microsoft.com/office/powerpoint/2010/main" xmlns="" val="179433876"/>
       </p:ext>
     </p:extLst>
   </p:cSld>
@@ -427,7 +428,7 @@
             <a:fld id="{D314177D-4D24-4D5B-9883-5FDB7C835FD3}" type="datetimeFigureOut">
               <a:rPr lang="zh-CN" altLang="en-US" smtClean="0"/>
               <a:pPr/>
-              <a:t>2016/9/26</a:t>
+              <a:t>2016/9/27</a:t>
             </a:fld>
             <a:endParaRPr lang="zh-CN" altLang="en-US"/>
           </a:p>
@@ -479,7 +480,7 @@
     </p:spTree>
     <p:extLst>
       <p:ext uri="{BB962C8B-B14F-4D97-AF65-F5344CB8AC3E}">
-        <p14:creationId xmlns="" xmlns:p14="http://schemas.microsoft.com/office/powerpoint/2010/main" val="3990689481"/>
+        <p14:creationId xmlns:p14="http://schemas.microsoft.com/office/powerpoint/2010/main" xmlns="" val="3990689481"/>
       </p:ext>
     </p:extLst>
   </p:cSld>
@@ -607,7 +608,7 @@
             <a:fld id="{D314177D-4D24-4D5B-9883-5FDB7C835FD3}" type="datetimeFigureOut">
               <a:rPr lang="zh-CN" altLang="en-US" smtClean="0"/>
               <a:pPr/>
-              <a:t>2016/9/26</a:t>
+              <a:t>2016/9/27</a:t>
             </a:fld>
             <a:endParaRPr lang="zh-CN" altLang="en-US"/>
           </a:p>
@@ -659,7 +660,7 @@
     </p:spTree>
     <p:extLst>
       <p:ext uri="{BB962C8B-B14F-4D97-AF65-F5344CB8AC3E}">
-        <p14:creationId xmlns="" xmlns:p14="http://schemas.microsoft.com/office/powerpoint/2010/main" val="2311475366"/>
+        <p14:creationId xmlns:p14="http://schemas.microsoft.com/office/powerpoint/2010/main" xmlns="" val="2311475366"/>
       </p:ext>
     </p:extLst>
   </p:cSld>
@@ -777,7 +778,7 @@
             <a:fld id="{D314177D-4D24-4D5B-9883-5FDB7C835FD3}" type="datetimeFigureOut">
               <a:rPr lang="zh-CN" altLang="en-US" smtClean="0"/>
               <a:pPr/>
-              <a:t>2016/9/26</a:t>
+              <a:t>2016/9/27</a:t>
             </a:fld>
             <a:endParaRPr lang="zh-CN" altLang="en-US"/>
           </a:p>
@@ -829,7 +830,7 @@
     </p:spTree>
     <p:extLst>
       <p:ext uri="{BB962C8B-B14F-4D97-AF65-F5344CB8AC3E}">
-        <p14:creationId xmlns="" xmlns:p14="http://schemas.microsoft.com/office/powerpoint/2010/main" val="559158518"/>
+        <p14:creationId xmlns:p14="http://schemas.microsoft.com/office/powerpoint/2010/main" xmlns="" val="559158518"/>
       </p:ext>
     </p:extLst>
   </p:cSld>
@@ -1024,7 +1025,7 @@
             <a:fld id="{D314177D-4D24-4D5B-9883-5FDB7C835FD3}" type="datetimeFigureOut">
               <a:rPr lang="zh-CN" altLang="en-US" smtClean="0"/>
               <a:pPr/>
-              <a:t>2016/9/26</a:t>
+              <a:t>2016/9/27</a:t>
             </a:fld>
             <a:endParaRPr lang="zh-CN" altLang="en-US"/>
           </a:p>
@@ -1076,7 +1077,7 @@
     </p:spTree>
     <p:extLst>
       <p:ext uri="{BB962C8B-B14F-4D97-AF65-F5344CB8AC3E}">
-        <p14:creationId xmlns="" xmlns:p14="http://schemas.microsoft.com/office/powerpoint/2010/main" val="162949256"/>
+        <p14:creationId xmlns:p14="http://schemas.microsoft.com/office/powerpoint/2010/main" xmlns="" val="162949256"/>
       </p:ext>
     </p:extLst>
   </p:cSld>
@@ -1255,7 +1256,7 @@
             <a:fld id="{D314177D-4D24-4D5B-9883-5FDB7C835FD3}" type="datetimeFigureOut">
               <a:rPr lang="zh-CN" altLang="en-US" smtClean="0"/>
               <a:pPr/>
-              <a:t>2016/9/26</a:t>
+              <a:t>2016/9/27</a:t>
             </a:fld>
             <a:endParaRPr lang="zh-CN" altLang="en-US"/>
           </a:p>
@@ -1307,7 +1308,7 @@
     </p:spTree>
     <p:extLst>
       <p:ext uri="{BB962C8B-B14F-4D97-AF65-F5344CB8AC3E}">
-        <p14:creationId xmlns="" xmlns:p14="http://schemas.microsoft.com/office/powerpoint/2010/main" val="1779635655"/>
+        <p14:creationId xmlns:p14="http://schemas.microsoft.com/office/powerpoint/2010/main" xmlns="" val="1779635655"/>
       </p:ext>
     </p:extLst>
   </p:cSld>
@@ -1621,7 +1622,7 @@
             <a:fld id="{D314177D-4D24-4D5B-9883-5FDB7C835FD3}" type="datetimeFigureOut">
               <a:rPr lang="zh-CN" altLang="en-US" smtClean="0"/>
               <a:pPr/>
-              <a:t>2016/9/26</a:t>
+              <a:t>2016/9/27</a:t>
             </a:fld>
             <a:endParaRPr lang="zh-CN" altLang="en-US"/>
           </a:p>
@@ -1673,7 +1674,7 @@
     </p:spTree>
     <p:extLst>
       <p:ext uri="{BB962C8B-B14F-4D97-AF65-F5344CB8AC3E}">
-        <p14:creationId xmlns="" xmlns:p14="http://schemas.microsoft.com/office/powerpoint/2010/main" val="1145708925"/>
+        <p14:creationId xmlns:p14="http://schemas.microsoft.com/office/powerpoint/2010/main" xmlns="" val="1145708925"/>
       </p:ext>
     </p:extLst>
   </p:cSld>
@@ -1740,7 +1741,7 @@
             <a:fld id="{D314177D-4D24-4D5B-9883-5FDB7C835FD3}" type="datetimeFigureOut">
               <a:rPr lang="zh-CN" altLang="en-US" smtClean="0"/>
               <a:pPr/>
-              <a:t>2016/9/26</a:t>
+              <a:t>2016/9/27</a:t>
             </a:fld>
             <a:endParaRPr lang="zh-CN" altLang="en-US"/>
           </a:p>
@@ -1792,7 +1793,7 @@
     </p:spTree>
     <p:extLst>
       <p:ext uri="{BB962C8B-B14F-4D97-AF65-F5344CB8AC3E}">
-        <p14:creationId xmlns="" xmlns:p14="http://schemas.microsoft.com/office/powerpoint/2010/main" val="2230175809"/>
+        <p14:creationId xmlns:p14="http://schemas.microsoft.com/office/powerpoint/2010/main" xmlns="" val="2230175809"/>
       </p:ext>
     </p:extLst>
   </p:cSld>
@@ -1837,7 +1838,7 @@
             <a:fld id="{D314177D-4D24-4D5B-9883-5FDB7C835FD3}" type="datetimeFigureOut">
               <a:rPr lang="zh-CN" altLang="en-US" smtClean="0"/>
               <a:pPr/>
-              <a:t>2016/9/26</a:t>
+              <a:t>2016/9/27</a:t>
             </a:fld>
             <a:endParaRPr lang="zh-CN" altLang="en-US"/>
           </a:p>
@@ -1889,7 +1890,7 @@
     </p:spTree>
     <p:extLst>
       <p:ext uri="{BB962C8B-B14F-4D97-AF65-F5344CB8AC3E}">
-        <p14:creationId xmlns="" xmlns:p14="http://schemas.microsoft.com/office/powerpoint/2010/main" val="3035505326"/>
+        <p14:creationId xmlns:p14="http://schemas.microsoft.com/office/powerpoint/2010/main" xmlns="" val="3035505326"/>
       </p:ext>
     </p:extLst>
   </p:cSld>
@@ -2114,7 +2115,7 @@
             <a:fld id="{D314177D-4D24-4D5B-9883-5FDB7C835FD3}" type="datetimeFigureOut">
               <a:rPr lang="zh-CN" altLang="en-US" smtClean="0"/>
               <a:pPr/>
-              <a:t>2016/9/26</a:t>
+              <a:t>2016/9/27</a:t>
             </a:fld>
             <a:endParaRPr lang="zh-CN" altLang="en-US"/>
           </a:p>
@@ -2166,7 +2167,7 @@
     </p:spTree>
     <p:extLst>
       <p:ext uri="{BB962C8B-B14F-4D97-AF65-F5344CB8AC3E}">
-        <p14:creationId xmlns="" xmlns:p14="http://schemas.microsoft.com/office/powerpoint/2010/main" val="1779068405"/>
+        <p14:creationId xmlns:p14="http://schemas.microsoft.com/office/powerpoint/2010/main" xmlns="" val="1779068405"/>
       </p:ext>
     </p:extLst>
   </p:cSld>
@@ -2368,7 +2369,7 @@
             <a:fld id="{D314177D-4D24-4D5B-9883-5FDB7C835FD3}" type="datetimeFigureOut">
               <a:rPr lang="zh-CN" altLang="en-US" smtClean="0"/>
               <a:pPr/>
-              <a:t>2016/9/26</a:t>
+              <a:t>2016/9/27</a:t>
             </a:fld>
             <a:endParaRPr lang="zh-CN" altLang="en-US"/>
           </a:p>
@@ -2420,7 +2421,7 @@
     </p:spTree>
     <p:extLst>
       <p:ext uri="{BB962C8B-B14F-4D97-AF65-F5344CB8AC3E}">
-        <p14:creationId xmlns="" xmlns:p14="http://schemas.microsoft.com/office/powerpoint/2010/main" val="1486777421"/>
+        <p14:creationId xmlns:p14="http://schemas.microsoft.com/office/powerpoint/2010/main" xmlns="" val="1486777421"/>
       </p:ext>
     </p:extLst>
   </p:cSld>
@@ -2581,7 +2582,7 @@
             <a:fld id="{D314177D-4D24-4D5B-9883-5FDB7C835FD3}" type="datetimeFigureOut">
               <a:rPr lang="zh-CN" altLang="en-US" smtClean="0"/>
               <a:pPr/>
-              <a:t>2016/9/26</a:t>
+              <a:t>2016/9/27</a:t>
             </a:fld>
             <a:endParaRPr lang="zh-CN" altLang="en-US"/>
           </a:p>
@@ -2669,7 +2670,7 @@
     </p:spTree>
     <p:extLst>
       <p:ext uri="{BB962C8B-B14F-4D97-AF65-F5344CB8AC3E}">
-        <p14:creationId xmlns="" xmlns:p14="http://schemas.microsoft.com/office/powerpoint/2010/main" val="4013215125"/>
+        <p14:creationId xmlns:p14="http://schemas.microsoft.com/office/powerpoint/2010/main" xmlns="" val="4013215125"/>
       </p:ext>
     </p:extLst>
   </p:cSld>
@@ -3040,7 +3041,7 @@
     </p:spTree>
     <p:extLst>
       <p:ext uri="{BB962C8B-B14F-4D97-AF65-F5344CB8AC3E}">
-        <p14:creationId xmlns="" xmlns:p14="http://schemas.microsoft.com/office/powerpoint/2010/main" val="853918072"/>
+        <p14:creationId xmlns:p14="http://schemas.microsoft.com/office/powerpoint/2010/main" xmlns="" val="853918072"/>
       </p:ext>
     </p:extLst>
   </p:cSld>
@@ -3084,11 +3085,7 @@
           <a:p>
             <a:r>
               <a:rPr lang="zh-CN" altLang="en-US" dirty="0" smtClean="0"/>
-              <a:t>持续交付成熟度</a:t>
-            </a:r>
-            <a:r>
-              <a:rPr lang="zh-CN" altLang="en-US" dirty="0" smtClean="0"/>
-              <a:t>模型</a:t>
+              <a:t>持续交付成熟度模型</a:t>
             </a:r>
             <a:r>
               <a:rPr lang="en-US" altLang="zh-CN" dirty="0" smtClean="0"/>
@@ -3128,11 +3125,7 @@
             </a:pPr>
             <a:r>
               <a:rPr lang="zh-CN" altLang="en-US" dirty="0" smtClean="0"/>
-              <a:t>持续</a:t>
-            </a:r>
-            <a:r>
-              <a:rPr lang="zh-CN" altLang="en-US" dirty="0" smtClean="0"/>
-              <a:t>集成（</a:t>
+              <a:t>持续集成（</a:t>
             </a:r>
             <a:r>
               <a:rPr lang="en-US" altLang="zh-CN" dirty="0" smtClean="0"/>
@@ -3146,11 +3139,7 @@
             </a:pPr>
             <a:r>
               <a:rPr lang="zh-CN" altLang="en-US" dirty="0" smtClean="0"/>
-              <a:t>环境</a:t>
-            </a:r>
-            <a:r>
-              <a:rPr lang="zh-CN" altLang="en-US" dirty="0" smtClean="0"/>
-              <a:t>与部署（</a:t>
+              <a:t>环境与部署（</a:t>
             </a:r>
             <a:r>
               <a:rPr lang="en-US" altLang="zh-CN" dirty="0" smtClean="0"/>
@@ -3168,11 +3157,7 @@
             </a:pPr>
             <a:r>
               <a:rPr lang="zh-CN" altLang="en-US" dirty="0" smtClean="0"/>
-              <a:t>可视化</a:t>
-            </a:r>
-            <a:r>
-              <a:rPr lang="zh-CN" altLang="en-US" dirty="0" smtClean="0"/>
-              <a:t>与可追踪性（</a:t>
+              <a:t>可视化与可追踪性（</a:t>
             </a:r>
             <a:r>
               <a:rPr lang="en-US" altLang="zh-CN" dirty="0" smtClean="0"/>
@@ -3190,11 +3175,7 @@
             </a:pPr>
             <a:r>
               <a:rPr lang="zh-CN" altLang="en-US" dirty="0" smtClean="0"/>
-              <a:t>测试</a:t>
-            </a:r>
-            <a:r>
-              <a:rPr lang="zh-CN" altLang="en-US" dirty="0" smtClean="0"/>
-              <a:t>（</a:t>
+              <a:t>测试（</a:t>
             </a:r>
             <a:r>
               <a:rPr lang="en-US" altLang="zh-CN" dirty="0" smtClean="0"/>
@@ -3212,11 +3193,7 @@
             </a:pPr>
             <a:r>
               <a:rPr lang="zh-CN" altLang="en-US" dirty="0" smtClean="0"/>
-              <a:t>数据管理</a:t>
-            </a:r>
-            <a:r>
-              <a:rPr lang="zh-CN" altLang="en-US" dirty="0" smtClean="0"/>
-              <a:t>（</a:t>
+              <a:t>数据管理（</a:t>
             </a:r>
             <a:r>
               <a:rPr lang="en-US" altLang="zh-CN" dirty="0" smtClean="0"/>
@@ -3234,11 +3211,7 @@
             </a:pPr>
             <a:r>
               <a:rPr lang="zh-CN" altLang="en-US" dirty="0" smtClean="0"/>
-              <a:t>配置管理</a:t>
-            </a:r>
-            <a:r>
-              <a:rPr lang="zh-CN" altLang="en-US" dirty="0" smtClean="0"/>
-              <a:t>（</a:t>
+              <a:t>配置管理（</a:t>
             </a:r>
             <a:r>
               <a:rPr lang="en-US" altLang="zh-CN" dirty="0" smtClean="0"/>
@@ -3256,23 +3229,11 @@
             </a:pPr>
             <a:r>
               <a:rPr lang="zh-CN" altLang="en-US" dirty="0" smtClean="0"/>
-              <a:t>组织</a:t>
-            </a:r>
-            <a:r>
-              <a:rPr lang="zh-CN" altLang="en-US" dirty="0" smtClean="0"/>
-              <a:t>协调性</a:t>
-            </a:r>
-            <a:r>
-              <a:rPr lang="zh-CN" altLang="en-US" dirty="0" smtClean="0"/>
-              <a:t>（</a:t>
+              <a:t>组织协调性（</a:t>
             </a:r>
             <a:r>
               <a:rPr lang="en-US" altLang="zh-CN" dirty="0" smtClean="0"/>
-              <a:t>Organizational </a:t>
-            </a:r>
-            <a:r>
-              <a:rPr lang="en-US" altLang="zh-CN" dirty="0" smtClean="0"/>
-              <a:t>Alignment</a:t>
+              <a:t>Organizational Alignment</a:t>
             </a:r>
             <a:r>
               <a:rPr lang="zh-CN" altLang="en-US" dirty="0" smtClean="0"/>
@@ -3306,11 +3267,7 @@
             <a:pPr lvl="1"/>
             <a:r>
               <a:rPr lang="zh-CN" altLang="en-US" dirty="0" smtClean="0"/>
-              <a:t>二</a:t>
-            </a:r>
-            <a:r>
-              <a:rPr lang="zh-CN" altLang="en-US" dirty="0" smtClean="0"/>
-              <a:t>级：可重复级</a:t>
+              <a:t>二级：可重复级</a:t>
             </a:r>
             <a:r>
               <a:rPr lang="en-US" altLang="zh-CN" dirty="0" smtClean="0"/>
@@ -3321,22 +3278,14 @@
             <a:pPr lvl="1"/>
             <a:r>
               <a:rPr lang="zh-CN" altLang="en-US" dirty="0" smtClean="0"/>
-              <a:t>三</a:t>
-            </a:r>
-            <a:r>
-              <a:rPr lang="zh-CN" altLang="en-US" dirty="0" smtClean="0"/>
-              <a:t>级：可定义级</a:t>
+              <a:t>三级：可定义级</a:t>
             </a:r>
           </a:p>
           <a:p>
             <a:pPr lvl="1"/>
             <a:r>
               <a:rPr lang="zh-CN" altLang="en-US" dirty="0" smtClean="0"/>
-              <a:t>四</a:t>
-            </a:r>
-            <a:r>
-              <a:rPr lang="zh-CN" altLang="en-US" dirty="0" smtClean="0"/>
-              <a:t>级：可定量级（</a:t>
+              <a:t>四级：可定量级（</a:t>
             </a:r>
             <a:r>
               <a:rPr lang="en-US" altLang="zh-CN" dirty="0" smtClean="0"/>
@@ -3351,11 +3300,7 @@
             <a:pPr lvl="1"/>
             <a:r>
               <a:rPr lang="zh-CN" altLang="en-US" dirty="0" smtClean="0"/>
-              <a:t>五</a:t>
-            </a:r>
-            <a:r>
-              <a:rPr lang="zh-CN" altLang="en-US" dirty="0" smtClean="0"/>
-              <a:t>级：改进级（</a:t>
+              <a:t>五级：改进级（</a:t>
             </a:r>
             <a:r>
               <a:rPr lang="en-US" altLang="zh-CN" dirty="0" smtClean="0"/>
@@ -3871,11 +3816,7 @@
             <a:pPr lvl="2"/>
             <a:r>
               <a:rPr lang="zh-CN" altLang="en-US" dirty="0" smtClean="0"/>
-              <a:t>分支策略设计，版本定义，版本库</a:t>
-            </a:r>
-            <a:r>
-              <a:rPr lang="zh-CN" altLang="en-US" dirty="0" smtClean="0"/>
-              <a:t>管理。</a:t>
+              <a:t>分支策略设计，版本定义，版本库管理。</a:t>
             </a:r>
             <a:endParaRPr lang="en-US" altLang="zh-CN" dirty="0" smtClean="0"/>
           </a:p>
@@ -4454,7 +4395,7 @@
     </p:spTree>
     <p:extLst>
       <p:ext uri="{BB962C8B-B14F-4D97-AF65-F5344CB8AC3E}">
-        <p14:creationId xmlns="" xmlns:p14="http://schemas.microsoft.com/office/powerpoint/2010/main" val="1635708100"/>
+        <p14:creationId xmlns:p14="http://schemas.microsoft.com/office/powerpoint/2010/main" xmlns="" val="1635708100"/>
       </p:ext>
     </p:extLst>
   </p:cSld>
@@ -4521,11 +4462,7 @@
           <a:p>
             <a:r>
               <a:rPr lang="zh-CN" altLang="en-US" dirty="0" smtClean="0"/>
-              <a:t>仅</a:t>
-            </a:r>
-            <a:r>
-              <a:rPr lang="zh-CN" altLang="en-US" dirty="0" smtClean="0"/>
-              <a:t>构建</a:t>
+              <a:t>仅构建</a:t>
             </a:r>
             <a:r>
               <a:rPr lang="en-US" altLang="zh-CN" dirty="0" smtClean="0"/>
@@ -4554,19 +4491,7 @@
           <a:p>
             <a:r>
               <a:rPr lang="zh-CN" altLang="en-US" dirty="0" smtClean="0"/>
-              <a:t>部署</a:t>
-            </a:r>
-            <a:r>
-              <a:rPr lang="zh-CN" altLang="en-US" dirty="0" smtClean="0"/>
-              <a:t>到</a:t>
-            </a:r>
-            <a:r>
-              <a:rPr lang="zh-CN" altLang="en-US" dirty="0" smtClean="0"/>
-              <a:t>生产环境的附本中</a:t>
-            </a:r>
-            <a:r>
-              <a:rPr lang="zh-CN" altLang="en-US" dirty="0" smtClean="0"/>
-              <a:t>。</a:t>
+              <a:t>部署到生产环境的附本中。</a:t>
             </a:r>
             <a:endParaRPr lang="en-US" altLang="zh-CN" dirty="0" smtClean="0"/>
           </a:p>
@@ -4705,6 +4630,109 @@
 </p:sld>
 </file>
 
+<file path=ppt/slides/slide22.xml><?xml version="1.0" encoding="utf-8"?>
+<p:sld xmlns:a="http://schemas.openxmlformats.org/drawingml/2006/main" xmlns:r="http://schemas.openxmlformats.org/officeDocument/2006/relationships" xmlns:p="http://schemas.openxmlformats.org/presentationml/2006/main">
+  <p:cSld>
+    <p:spTree>
+      <p:nvGrpSpPr>
+        <p:cNvPr id="1" name=""/>
+        <p:cNvGrpSpPr/>
+        <p:nvPr/>
+      </p:nvGrpSpPr>
+      <p:grpSpPr>
+        <a:xfrm>
+          <a:off x="0" y="0"/>
+          <a:ext cx="0" cy="0"/>
+          <a:chOff x="0" y="0"/>
+          <a:chExt cx="0" cy="0"/>
+        </a:xfrm>
+      </p:grpSpPr>
+      <p:sp>
+        <p:nvSpPr>
+          <p:cNvPr id="2" name="标题 1"/>
+          <p:cNvSpPr>
+            <a:spLocks noGrp="1"/>
+          </p:cNvSpPr>
+          <p:nvPr>
+            <p:ph type="title"/>
+          </p:nvPr>
+        </p:nvSpPr>
+        <p:spPr/>
+        <p:txBody>
+          <a:bodyPr/>
+          <a:lstStyle/>
+          <a:p>
+            <a:r>
+              <a:rPr lang="en-US" altLang="zh-CN" dirty="0" smtClean="0"/>
+              <a:t>Continuous delivery workflows with the branch-per-issue model</a:t>
+            </a:r>
+            <a:endParaRPr lang="zh-CN" altLang="en-US" dirty="0"/>
+          </a:p>
+        </p:txBody>
+      </p:sp>
+      <p:sp>
+        <p:nvSpPr>
+          <p:cNvPr id="3" name="内容占位符 2"/>
+          <p:cNvSpPr>
+            <a:spLocks noGrp="1"/>
+          </p:cNvSpPr>
+          <p:nvPr>
+            <p:ph idx="1"/>
+          </p:nvPr>
+        </p:nvSpPr>
+        <p:spPr/>
+        <p:txBody>
+          <a:bodyPr/>
+          <a:lstStyle/>
+          <a:p>
+            <a:r>
+              <a:rPr lang="en-US" altLang="zh-CN" dirty="0" smtClean="0"/>
+              <a:t>Step 0: set up your tool integrations</a:t>
+            </a:r>
+          </a:p>
+          <a:p>
+            <a:endParaRPr lang="zh-CN" altLang="en-US" dirty="0"/>
+          </a:p>
+        </p:txBody>
+      </p:sp>
+      <p:sp>
+        <p:nvSpPr>
+          <p:cNvPr id="4" name="TextBox 3"/>
+          <p:cNvSpPr txBox="1"/>
+          <p:nvPr/>
+        </p:nvSpPr>
+        <p:spPr>
+          <a:xfrm>
+            <a:off x="241038" y="6278137"/>
+            <a:ext cx="11735905" cy="369332"/>
+          </a:xfrm>
+          <a:prstGeom prst="rect">
+            <a:avLst/>
+          </a:prstGeom>
+          <a:noFill/>
+        </p:spPr>
+        <p:txBody>
+          <a:bodyPr wrap="none" rtlCol="0">
+            <a:spAutoFit/>
+          </a:bodyPr>
+          <a:lstStyle/>
+          <a:p>
+            <a:r>
+              <a:rPr lang="en-US" altLang="zh-CN" dirty="0" smtClean="0"/>
+              <a:t>https://www.atlassian.com/continuous-delivery/continuous-delivery-workflows-with-feature-branching-and-gitflow</a:t>
+            </a:r>
+            <a:endParaRPr lang="zh-CN" altLang="en-US" dirty="0"/>
+          </a:p>
+        </p:txBody>
+      </p:sp>
+    </p:spTree>
+  </p:cSld>
+  <p:clrMapOvr>
+    <a:masterClrMapping/>
+  </p:clrMapOvr>
+</p:sld>
+</file>
+
 <file path=ppt/slides/slide3.xml><?xml version="1.0" encoding="utf-8"?>
 <p:sld xmlns:a="http://schemas.openxmlformats.org/drawingml/2006/main" xmlns:r="http://schemas.openxmlformats.org/officeDocument/2006/relationships" xmlns:p="http://schemas.openxmlformats.org/presentationml/2006/main">
   <p:cSld>
@@ -4795,7 +4823,6 @@
               <a:rPr lang="en-US" altLang="zh-CN" dirty="0" smtClean="0"/>
               <a:t> </a:t>
             </a:r>
-            <a:endParaRPr lang="en-US" altLang="zh-CN" dirty="0" smtClean="0"/>
           </a:p>
           <a:p>
             <a:r>
@@ -4910,17 +4937,12 @@
             <a:pPr lvl="1"/>
             <a:r>
               <a:rPr lang="zh-CN" altLang="en-US" dirty="0" smtClean="0"/>
-              <a:t>敏捷管理</a:t>
-            </a:r>
-            <a:r>
-              <a:rPr lang="zh-CN" altLang="en-US" dirty="0" smtClean="0"/>
-              <a:t>：</a:t>
+              <a:t>敏捷管理：</a:t>
             </a:r>
             <a:r>
               <a:rPr lang="en-US" altLang="zh-CN" dirty="0" smtClean="0"/>
               <a:t>JIRA</a:t>
             </a:r>
-            <a:endParaRPr lang="en-US" altLang="zh-CN" dirty="0" smtClean="0"/>
           </a:p>
           <a:p>
             <a:pPr lvl="1"/>
@@ -4930,11 +4952,7 @@
             </a:r>
             <a:r>
               <a:rPr lang="en-US" altLang="zh-CN" dirty="0" err="1" smtClean="0"/>
-              <a:t>Git</a:t>
-            </a:r>
-            <a:r>
-              <a:rPr lang="en-US" altLang="zh-CN" dirty="0" err="1" smtClean="0"/>
-              <a:t>+Gerrit</a:t>
+              <a:t>Git+Gerrit</a:t>
             </a:r>
             <a:r>
               <a:rPr lang="en-US" altLang="zh-CN" dirty="0" smtClean="0"/>
@@ -4942,11 +4960,7 @@
             </a:r>
             <a:r>
               <a:rPr lang="zh-CN" altLang="en-US" dirty="0" smtClean="0"/>
-              <a:t>分支策略</a:t>
-            </a:r>
-            <a:r>
-              <a:rPr lang="zh-CN" altLang="en-US" dirty="0" smtClean="0"/>
-              <a:t>，版本定义，</a:t>
+              <a:t>分支策略，版本定义，</a:t>
             </a:r>
             <a:r>
               <a:rPr lang="en-US" altLang="zh-CN" dirty="0" err="1" smtClean="0"/>
@@ -4960,7 +4974,6 @@
               <a:rPr lang="en-US" altLang="zh-CN" dirty="0" smtClean="0"/>
               <a:t>)</a:t>
             </a:r>
-            <a:endParaRPr lang="en-US" altLang="zh-CN" dirty="0" smtClean="0"/>
           </a:p>
           <a:p>
             <a:pPr lvl="1"/>
@@ -4972,7 +4985,6 @@
               <a:rPr lang="en-US" altLang="zh-CN" dirty="0" smtClean="0"/>
               <a:t>Puppet </a:t>
             </a:r>
-            <a:endParaRPr lang="en-US" altLang="zh-CN" dirty="0" smtClean="0"/>
           </a:p>
           <a:p>
             <a:r>
@@ -4991,7 +5003,6 @@
               <a:rPr lang="en-US" altLang="zh-CN" dirty="0" smtClean="0"/>
               <a:t>Maven</a:t>
             </a:r>
-            <a:endParaRPr lang="en-US" altLang="zh-CN" dirty="0" smtClean="0"/>
           </a:p>
           <a:p>
             <a:r>
@@ -5006,7 +5017,6 @@
               <a:rPr lang="en-US" altLang="zh-CN" dirty="0" smtClean="0"/>
               <a:t>Bamboo, Jenkins</a:t>
             </a:r>
-            <a:endParaRPr lang="en-US" altLang="zh-CN" dirty="0" smtClean="0"/>
           </a:p>
           <a:p>
             <a:r>
@@ -5191,7 +5201,7 @@
           <a:blip r:embed="rId2">
             <a:extLst>
               <a:ext uri="{28A0092B-C50C-407E-A947-70E740481C1C}">
-                <a14:useLocalDpi xmlns="" xmlns:a14="http://schemas.microsoft.com/office/drawing/2010/main" val="0"/>
+                <a14:useLocalDpi xmlns:a14="http://schemas.microsoft.com/office/drawing/2010/main" xmlns="" val="0"/>
               </a:ext>
             </a:extLst>
           </a:blip>
@@ -5212,7 +5222,7 @@
     </p:spTree>
     <p:extLst>
       <p:ext uri="{BB962C8B-B14F-4D97-AF65-F5344CB8AC3E}">
-        <p14:creationId xmlns="" xmlns:p14="http://schemas.microsoft.com/office/powerpoint/2010/main" val="1384145767"/>
+        <p14:creationId xmlns:p14="http://schemas.microsoft.com/office/powerpoint/2010/main" xmlns="" val="1384145767"/>
       </p:ext>
     </p:extLst>
   </p:cSld>
@@ -5601,11 +5611,7 @@
             </a:r>
             <a:r>
               <a:rPr lang="zh-CN" altLang="en-US" dirty="0" smtClean="0"/>
-              <a:t>分支</a:t>
-            </a:r>
-            <a:r>
-              <a:rPr lang="zh-CN" altLang="en-US" dirty="0" smtClean="0"/>
-              <a:t>策略</a:t>
+              <a:t>分支策略</a:t>
             </a:r>
             <a:endParaRPr lang="zh-CN" altLang="en-US" dirty="0"/>
           </a:p>
@@ -5717,13 +5723,7 @@
               <a:rPr lang="en-US" altLang="zh-CN" sz="800" dirty="0" smtClean="0">
                 <a:hlinkClick r:id="rId3"/>
               </a:rPr>
-              <a:t>https://</a:t>
-            </a:r>
-            <a:r>
-              <a:rPr lang="en-US" altLang="zh-CN" sz="800" dirty="0" smtClean="0">
-                <a:hlinkClick r:id="rId3"/>
-              </a:rPr>
-              <a:t>www.atlassian.com/git/tutorials/comparing-workflows/gitflow-workflow</a:t>
+              <a:t>https://www.atlassian.com/git/tutorials/comparing-workflows/gitflow-workflow</a:t>
             </a:r>
             <a:endParaRPr lang="en-US" altLang="zh-CN" sz="800" dirty="0" smtClean="0"/>
           </a:p>
@@ -5876,7 +5876,7 @@
     </p:spTree>
     <p:extLst>
       <p:ext uri="{BB962C8B-B14F-4D97-AF65-F5344CB8AC3E}">
-        <p14:creationId xmlns="" xmlns:p14="http://schemas.microsoft.com/office/powerpoint/2010/main" val="2745366316"/>
+        <p14:creationId xmlns:p14="http://schemas.microsoft.com/office/powerpoint/2010/main" xmlns="" val="2745366316"/>
       </p:ext>
     </p:extLst>
   </p:cSld>
@@ -6175,7 +6175,7 @@
   <a:extraClrSchemeLst/>
   <a:extLst>
     <a:ext uri="{05A4C25C-085E-4340-85A3-A5531E510DB2}">
-      <thm15:themeFamily xmlns="" xmlns:thm15="http://schemas.microsoft.com/office/thememl/2012/main" name="Office Theme" id="{62F939B6-93AF-4DB8-9C6B-D6C7DFDC589F}" vid="{4A3C46E8-61CC-4603-A589-7422A47A8E4A}"/>
+      <thm15:themeFamily xmlns:thm15="http://schemas.microsoft.com/office/thememl/2012/main" xmlns="" name="Office Theme" id="{62F939B6-93AF-4DB8-9C6B-D6C7DFDC589F}" vid="{4A3C46E8-61CC-4603-A589-7422A47A8E4A}"/>
     </a:ext>
   </a:extLst>
 </a:theme>

</xml_diff>